<commit_message>
docs(milestone4): added pushdown slide [skip-tests]
</commit_message>
<xml_diff>
--- a/docs/milestones/milestone4/milestone4_presentation.pptx
+++ b/docs/milestones/milestone4/milestone4_presentation.pptx
@@ -5,7 +5,7 @@
     <p:sldMasterId id="2147483648" r:id="rId1"/>
   </p:sldMasterIdLst>
   <p:notesMasterIdLst>
-    <p:notesMasterId r:id="rId9"/>
+    <p:notesMasterId r:id="rId10"/>
   </p:notesMasterIdLst>
   <p:sldIdLst>
     <p:sldId id="256" r:id="rId2"/>
@@ -14,7 +14,8 @@
     <p:sldId id="264" r:id="rId5"/>
     <p:sldId id="266" r:id="rId6"/>
     <p:sldId id="267" r:id="rId7"/>
-    <p:sldId id="262" r:id="rId8"/>
+    <p:sldId id="275" r:id="rId8"/>
+    <p:sldId id="262" r:id="rId9"/>
   </p:sldIdLst>
   <p:sldSz cx="12192000" cy="6858000"/>
   <p:notesSz cx="6858000" cy="9144000"/>
@@ -214,7 +215,7 @@
           <a:p>
             <a:fld id="{842CE5A1-857B-214D-8BEE-AF65CEFCD544}" type="datetimeFigureOut">
               <a:rPr lang="de-DE" smtClean="0"/>
-              <a:t>16.06.2022</a:t>
+              <a:t>17.06.2022</a:t>
             </a:fld>
             <a:endParaRPr lang="de-DE"/>
           </a:p>
@@ -2594,6 +2595,28 @@
             <a:endParaRPr lang="de-DE" dirty="0"/>
           </a:p>
           <a:p>
+            <a:pPr marL="0" indent="0">
+              <a:buNone/>
+            </a:pPr>
+            <a:r>
+              <a:rPr lang="de-DE" dirty="0"/>
+              <a:t>Handhabung von Randbedingungen bei </a:t>
+            </a:r>
+            <a:r>
+              <a:rPr lang="de-DE" dirty="0" err="1"/>
+              <a:t>Selection</a:t>
+            </a:r>
+            <a:r>
+              <a:rPr lang="de-DE" dirty="0"/>
+              <a:t> </a:t>
+            </a:r>
+            <a:r>
+              <a:rPr lang="de-DE" dirty="0" err="1"/>
+              <a:t>Pushdown</a:t>
+            </a:r>
+            <a:endParaRPr lang="de-DE" dirty="0"/>
+          </a:p>
+          <a:p>
             <a:pPr lvl="1"/>
             <a:endParaRPr lang="de-DE" dirty="0"/>
           </a:p>
@@ -3688,6 +3711,396 @@
 </file>
 
 <file path=ppt/slides/slide7.xml><?xml version="1.0" encoding="utf-8"?>
+<p:sld xmlns:a="http://schemas.openxmlformats.org/drawingml/2006/main" xmlns:r="http://schemas.openxmlformats.org/officeDocument/2006/relationships" xmlns:p="http://schemas.openxmlformats.org/presentationml/2006/main">
+  <p:cSld>
+    <p:spTree>
+      <p:nvGrpSpPr>
+        <p:cNvPr id="1" name=""/>
+        <p:cNvGrpSpPr/>
+        <p:nvPr/>
+      </p:nvGrpSpPr>
+      <p:grpSpPr>
+        <a:xfrm>
+          <a:off x="0" y="0"/>
+          <a:ext cx="0" cy="0"/>
+          <a:chOff x="0" y="0"/>
+          <a:chExt cx="0" cy="0"/>
+        </a:xfrm>
+      </p:grpSpPr>
+      <p:sp>
+        <p:nvSpPr>
+          <p:cNvPr id="2" name="Titel 1">
+            <a:extLst>
+              <a:ext uri="{FF2B5EF4-FFF2-40B4-BE49-F238E27FC236}">
+                <a16:creationId xmlns:a16="http://schemas.microsoft.com/office/drawing/2014/main" id="{94EB8EF4-F3FC-D8E9-23AF-B187ED2AF587}"/>
+              </a:ext>
+            </a:extLst>
+          </p:cNvPr>
+          <p:cNvSpPr>
+            <a:spLocks noGrp="1"/>
+          </p:cNvSpPr>
+          <p:nvPr>
+            <p:ph type="ctrTitle"/>
+          </p:nvPr>
+        </p:nvSpPr>
+        <p:spPr/>
+        <p:txBody>
+          <a:bodyPr/>
+          <a:lstStyle/>
+          <a:p>
+            <a:r>
+              <a:rPr lang="en-US" dirty="0"/>
+              <a:t>Optimizer – Selection Pushdown – Projection Operator</a:t>
+            </a:r>
+          </a:p>
+        </p:txBody>
+      </p:sp>
+      <p:sp>
+        <p:nvSpPr>
+          <p:cNvPr id="3" name="Untertitel 2">
+            <a:extLst>
+              <a:ext uri="{FF2B5EF4-FFF2-40B4-BE49-F238E27FC236}">
+                <a16:creationId xmlns:a16="http://schemas.microsoft.com/office/drawing/2014/main" id="{C7B70E0A-5EE9-C034-B4D4-9FD259059590}"/>
+              </a:ext>
+            </a:extLst>
+          </p:cNvPr>
+          <p:cNvSpPr>
+            <a:spLocks noGrp="1"/>
+          </p:cNvSpPr>
+          <p:nvPr>
+            <p:ph type="subTitle" idx="1"/>
+          </p:nvPr>
+        </p:nvSpPr>
+        <p:spPr/>
+        <p:txBody>
+          <a:bodyPr/>
+          <a:lstStyle/>
+          <a:p>
+            <a:pPr marL="457200" indent="-457200">
+              <a:lnSpc>
+                <a:spcPct val="100000"/>
+              </a:lnSpc>
+              <a:buFont typeface="Arial" panose="020B0604020202020204" pitchFamily="34" charset="0"/>
+              <a:buChar char="•"/>
+            </a:pPr>
+            <a:r>
+              <a:rPr lang="de-DE" dirty="0"/>
+              <a:t>Referenzierte Spalten müssen umbenannt werden</a:t>
+            </a:r>
+            <a:br>
+              <a:rPr lang="de-DE" dirty="0"/>
+            </a:br>
+            <a:r>
+              <a:rPr lang="de-DE" dirty="0">
+                <a:sym typeface="Wingdings" panose="05000000000000000000" pitchFamily="2" charset="2"/>
+              </a:rPr>
+              <a:t> Aliase und Fully-</a:t>
+            </a:r>
+            <a:r>
+              <a:rPr lang="de-DE" dirty="0" err="1">
+                <a:sym typeface="Wingdings" panose="05000000000000000000" pitchFamily="2" charset="2"/>
+              </a:rPr>
+              <a:t>Qualified</a:t>
+            </a:r>
+            <a:r>
+              <a:rPr lang="de-DE" dirty="0">
+                <a:sym typeface="Wingdings" panose="05000000000000000000" pitchFamily="2" charset="2"/>
+              </a:rPr>
+              <a:t>-Namen</a:t>
+            </a:r>
+          </a:p>
+          <a:p>
+            <a:pPr marL="457200" indent="-457200">
+              <a:lnSpc>
+                <a:spcPct val="100000"/>
+              </a:lnSpc>
+              <a:buFont typeface="Arial" panose="020B0604020202020204" pitchFamily="34" charset="0"/>
+              <a:buChar char="•"/>
+            </a:pPr>
+            <a:r>
+              <a:rPr lang="de-DE" dirty="0">
+                <a:sym typeface="Wingdings" panose="05000000000000000000" pitchFamily="2" charset="2"/>
+              </a:rPr>
+              <a:t>Falls berechnete Spalten referenziert werden, kann nicht gepusht werden</a:t>
+            </a:r>
+            <a:br>
+              <a:rPr lang="de-DE" dirty="0">
+                <a:sym typeface="Wingdings" panose="05000000000000000000" pitchFamily="2" charset="2"/>
+              </a:rPr>
+            </a:br>
+            <a:r>
+              <a:rPr lang="de-DE" dirty="0">
+                <a:sym typeface="Wingdings" panose="05000000000000000000" pitchFamily="2" charset="2"/>
+              </a:rPr>
+              <a:t> z.B. bei </a:t>
+            </a:r>
+            <a:r>
+              <a:rPr lang="de-DE" dirty="0" err="1">
+                <a:latin typeface="Courier New" panose="02070309020205020404" pitchFamily="49" charset="0"/>
+                <a:cs typeface="Courier New" panose="02070309020205020404" pitchFamily="49" charset="0"/>
+                <a:sym typeface="Wingdings" panose="05000000000000000000" pitchFamily="2" charset="2"/>
+              </a:rPr>
+              <a:t>fullName</a:t>
+            </a:r>
+            <a:r>
+              <a:rPr lang="de-DE" dirty="0">
+                <a:latin typeface="Courier New" panose="02070309020205020404" pitchFamily="49" charset="0"/>
+                <a:cs typeface="Courier New" panose="02070309020205020404" pitchFamily="49" charset="0"/>
+                <a:sym typeface="Wingdings" panose="05000000000000000000" pitchFamily="2" charset="2"/>
+              </a:rPr>
+              <a:t> = </a:t>
+            </a:r>
+            <a:r>
+              <a:rPr lang="de-DE" dirty="0" err="1">
+                <a:latin typeface="Courier New" panose="02070309020205020404" pitchFamily="49" charset="0"/>
+                <a:cs typeface="Courier New" panose="02070309020205020404" pitchFamily="49" charset="0"/>
+                <a:sym typeface="Wingdings" panose="05000000000000000000" pitchFamily="2" charset="2"/>
+              </a:rPr>
+              <a:t>firstName</a:t>
+            </a:r>
+            <a:r>
+              <a:rPr lang="de-DE" dirty="0">
+                <a:latin typeface="Courier New" panose="02070309020205020404" pitchFamily="49" charset="0"/>
+                <a:cs typeface="Courier New" panose="02070309020205020404" pitchFamily="49" charset="0"/>
+                <a:sym typeface="Wingdings" panose="05000000000000000000" pitchFamily="2" charset="2"/>
+              </a:rPr>
+              <a:t> + “ “ + </a:t>
+            </a:r>
+            <a:r>
+              <a:rPr lang="de-DE" dirty="0" err="1">
+                <a:latin typeface="Courier New" panose="02070309020205020404" pitchFamily="49" charset="0"/>
+                <a:cs typeface="Courier New" panose="02070309020205020404" pitchFamily="49" charset="0"/>
+                <a:sym typeface="Wingdings" panose="05000000000000000000" pitchFamily="2" charset="2"/>
+              </a:rPr>
+              <a:t>lastName</a:t>
+            </a:r>
+            <a:endParaRPr lang="de-DE" dirty="0">
+              <a:latin typeface="Courier New" panose="02070309020205020404" pitchFamily="49" charset="0"/>
+              <a:cs typeface="Courier New" panose="02070309020205020404" pitchFamily="49" charset="0"/>
+              <a:sym typeface="Wingdings" panose="05000000000000000000" pitchFamily="2" charset="2"/>
+            </a:endParaRPr>
+          </a:p>
+          <a:p>
+            <a:pPr marL="457200" indent="-457200">
+              <a:lnSpc>
+                <a:spcPct val="150000"/>
+              </a:lnSpc>
+              <a:buFont typeface="Arial" panose="020B0604020202020204" pitchFamily="34" charset="0"/>
+              <a:buChar char="•"/>
+            </a:pPr>
+            <a:r>
+              <a:rPr lang="de-DE" dirty="0">
+                <a:cs typeface="Courier New" panose="02070309020205020404" pitchFamily="49" charset="0"/>
+                <a:sym typeface="Wingdings" panose="05000000000000000000" pitchFamily="2" charset="2"/>
+              </a:rPr>
+              <a:t>Falls alle Bedingungen erfüllt werden, wird auf „</a:t>
+            </a:r>
+            <a:r>
+              <a:rPr lang="de-DE" dirty="0" err="1">
+                <a:cs typeface="Courier New" panose="02070309020205020404" pitchFamily="49" charset="0"/>
+                <a:sym typeface="Wingdings" panose="05000000000000000000" pitchFamily="2" charset="2"/>
+              </a:rPr>
+              <a:t>Projection</a:t>
+            </a:r>
+            <a:r>
+              <a:rPr lang="de-DE" dirty="0">
+                <a:cs typeface="Courier New" panose="02070309020205020404" pitchFamily="49" charset="0"/>
+                <a:sym typeface="Wingdings" panose="05000000000000000000" pitchFamily="2" charset="2"/>
+              </a:rPr>
+              <a:t>“ gepusht</a:t>
+            </a:r>
+            <a:endParaRPr lang="de-DE" dirty="0"/>
+          </a:p>
+        </p:txBody>
+      </p:sp>
+      <p:sp>
+        <p:nvSpPr>
+          <p:cNvPr id="4" name="Foliennummernplatzhalter 3">
+            <a:extLst>
+              <a:ext uri="{FF2B5EF4-FFF2-40B4-BE49-F238E27FC236}">
+                <a16:creationId xmlns:a16="http://schemas.microsoft.com/office/drawing/2014/main" id="{1F85B4E5-6383-6230-5B9F-D0DBE38CFF06}"/>
+              </a:ext>
+            </a:extLst>
+          </p:cNvPr>
+          <p:cNvSpPr>
+            <a:spLocks noGrp="1"/>
+          </p:cNvSpPr>
+          <p:nvPr>
+            <p:ph type="sldNum" sz="quarter" idx="12"/>
+          </p:nvPr>
+        </p:nvSpPr>
+        <p:spPr/>
+        <p:txBody>
+          <a:bodyPr/>
+          <a:lstStyle/>
+          <a:p>
+            <a:r>
+              <a:rPr lang="de-DE" dirty="0"/>
+              <a:t>Seite </a:t>
+            </a:r>
+            <a:fld id="{EBA229B5-7CFD-BC45-B1DD-7E8FA6FF2A01}" type="slidenum">
+              <a:rPr lang="de-DE" smtClean="0"/>
+              <a:pPr/>
+              <a:t>7</a:t>
+            </a:fld>
+            <a:endParaRPr lang="de-DE" dirty="0"/>
+          </a:p>
+        </p:txBody>
+      </p:sp>
+      <p:sp>
+        <p:nvSpPr>
+          <p:cNvPr id="5" name="Fußzeilenplatzhalter 4">
+            <a:extLst>
+              <a:ext uri="{FF2B5EF4-FFF2-40B4-BE49-F238E27FC236}">
+                <a16:creationId xmlns:a16="http://schemas.microsoft.com/office/drawing/2014/main" id="{4931376D-2177-D535-E88E-6A0081481E71}"/>
+              </a:ext>
+            </a:extLst>
+          </p:cNvPr>
+          <p:cNvSpPr>
+            <a:spLocks noGrp="1"/>
+          </p:cNvSpPr>
+          <p:nvPr>
+            <p:ph type="ftr" sz="quarter" idx="3"/>
+          </p:nvPr>
+        </p:nvSpPr>
+        <p:spPr/>
+        <p:txBody>
+          <a:bodyPr/>
+          <a:lstStyle/>
+          <a:p>
+            <a:r>
+              <a:rPr lang="en-US" b="1" dirty="0"/>
+              <a:t>Team 3</a:t>
+            </a:r>
+            <a:br>
+              <a:rPr lang="en-US" dirty="0"/>
+            </a:br>
+            <a:r>
+              <a:rPr lang="en-US" dirty="0"/>
+              <a:t>Gründlinger Diana, Huber Marcel, Klotz Thomas, Targa Aaron, Thalmann Matthias</a:t>
+            </a:r>
+          </a:p>
+        </p:txBody>
+      </p:sp>
+      <p:grpSp>
+        <p:nvGrpSpPr>
+          <p:cNvPr id="9" name="Gruppieren 8">
+            <a:extLst>
+              <a:ext uri="{FF2B5EF4-FFF2-40B4-BE49-F238E27FC236}">
+                <a16:creationId xmlns:a16="http://schemas.microsoft.com/office/drawing/2014/main" id="{C98FEB03-826C-1FA3-E299-F850A6D5D122}"/>
+              </a:ext>
+            </a:extLst>
+          </p:cNvPr>
+          <p:cNvGrpSpPr/>
+          <p:nvPr/>
+        </p:nvGrpSpPr>
+        <p:grpSpPr>
+          <a:xfrm>
+            <a:off x="2520867" y="3257358"/>
+            <a:ext cx="7150266" cy="2403889"/>
+            <a:chOff x="2884152" y="3303350"/>
+            <a:chExt cx="7571063" cy="2545359"/>
+          </a:xfrm>
+        </p:grpSpPr>
+        <p:sp>
+          <p:nvSpPr>
+            <p:cNvPr id="8" name="Rechteck 7">
+              <a:extLst>
+                <a:ext uri="{FF2B5EF4-FFF2-40B4-BE49-F238E27FC236}">
+                  <a16:creationId xmlns:a16="http://schemas.microsoft.com/office/drawing/2014/main" id="{AC81477C-B3F4-4176-465D-8F4B4FB0309F}"/>
+                </a:ext>
+              </a:extLst>
+            </p:cNvPr>
+            <p:cNvSpPr/>
+            <p:nvPr/>
+          </p:nvSpPr>
+          <p:spPr>
+            <a:xfrm>
+              <a:off x="2884152" y="3303350"/>
+              <a:ext cx="7571063" cy="2545359"/>
+            </a:xfrm>
+            <a:prstGeom prst="rect">
+              <a:avLst/>
+            </a:prstGeom>
+            <a:solidFill>
+              <a:schemeClr val="bg1">
+                <a:lumMod val="95000"/>
+              </a:schemeClr>
+            </a:solidFill>
+            <a:ln>
+              <a:noFill/>
+            </a:ln>
+          </p:spPr>
+          <p:style>
+            <a:lnRef idx="2">
+              <a:schemeClr val="accent1">
+                <a:shade val="50000"/>
+              </a:schemeClr>
+            </a:lnRef>
+            <a:fillRef idx="1">
+              <a:schemeClr val="accent1"/>
+            </a:fillRef>
+            <a:effectRef idx="0">
+              <a:schemeClr val="accent1"/>
+            </a:effectRef>
+            <a:fontRef idx="minor">
+              <a:schemeClr val="lt1"/>
+            </a:fontRef>
+          </p:style>
+          <p:txBody>
+            <a:bodyPr rtlCol="0" anchor="ctr"/>
+            <a:lstStyle/>
+            <a:p>
+              <a:pPr algn="ctr"/>
+              <a:endParaRPr lang="de-DE" dirty="0"/>
+            </a:p>
+          </p:txBody>
+        </p:sp>
+        <p:pic>
+          <p:nvPicPr>
+            <p:cNvPr id="7" name="Grafik 6">
+              <a:extLst>
+                <a:ext uri="{FF2B5EF4-FFF2-40B4-BE49-F238E27FC236}">
+                  <a16:creationId xmlns:a16="http://schemas.microsoft.com/office/drawing/2014/main" id="{0B71F420-80A4-F003-DB25-4D7FDA10E3D6}"/>
+                </a:ext>
+              </a:extLst>
+            </p:cNvPr>
+            <p:cNvPicPr>
+              <a:picLocks noChangeAspect="1"/>
+            </p:cNvPicPr>
+            <p:nvPr/>
+          </p:nvPicPr>
+          <p:blipFill>
+            <a:blip r:embed="rId2"/>
+            <a:stretch>
+              <a:fillRect/>
+            </a:stretch>
+          </p:blipFill>
+          <p:spPr>
+            <a:xfrm>
+              <a:off x="2927648" y="3350678"/>
+              <a:ext cx="7485087" cy="2454377"/>
+            </a:xfrm>
+            <a:prstGeom prst="rect">
+              <a:avLst/>
+            </a:prstGeom>
+          </p:spPr>
+        </p:pic>
+      </p:grpSp>
+    </p:spTree>
+    <p:extLst>
+      <p:ext uri="{BB962C8B-B14F-4D97-AF65-F5344CB8AC3E}">
+        <p14:creationId xmlns:p14="http://schemas.microsoft.com/office/powerpoint/2010/main" val="4191159588"/>
+      </p:ext>
+    </p:extLst>
+  </p:cSld>
+  <p:clrMapOvr>
+    <a:masterClrMapping/>
+  </p:clrMapOvr>
+</p:sld>
+</file>
+
+<file path=ppt/slides/slide8.xml><?xml version="1.0" encoding="utf-8"?>
 <p:sld xmlns:a="http://schemas.openxmlformats.org/drawingml/2006/main" xmlns:r="http://schemas.openxmlformats.org/officeDocument/2006/relationships" xmlns:p="http://schemas.openxmlformats.org/presentationml/2006/main">
   <p:cSld>
     <p:spTree>

</xml_diff>